<commit_message>
report and reduction code
</commit_message>
<xml_diff>
--- a/project/cs6890-testing-project-presentation.pptx
+++ b/project/cs6890-testing-project-presentation.pptx
@@ -5,10 +5,10 @@
     <p:sldMasterId id="2147483648" r:id="rId1"/>
   </p:sldMasterIdLst>
   <p:notesMasterIdLst>
-    <p:notesMasterId r:id="rId21"/>
+    <p:notesMasterId r:id="rId22"/>
   </p:notesMasterIdLst>
   <p:handoutMasterIdLst>
-    <p:handoutMasterId r:id="rId22"/>
+    <p:handoutMasterId r:id="rId23"/>
   </p:handoutMasterIdLst>
   <p:sldIdLst>
     <p:sldId id="256" r:id="rId2"/>
@@ -30,6 +30,7 @@
     <p:sldId id="267" r:id="rId18"/>
     <p:sldId id="270" r:id="rId19"/>
     <p:sldId id="257" r:id="rId20"/>
+    <p:sldId id="275" r:id="rId21"/>
   </p:sldIdLst>
   <p:sldSz cx="9144000" cy="6858000" type="screen4x3"/>
   <p:notesSz cx="6858000" cy="9144000"/>
@@ -213,7 +214,7 @@
           <a:p>
             <a:fld id="{B0DC4EFF-83D4-0C4C-90A7-6FCA90AA4C1E}" type="datetimeFigureOut">
               <a:rPr lang="en-US" smtClean="0"/>
-              <a:t>4/18/12</a:t>
+              <a:t>4/19/12</a:t>
             </a:fld>
             <a:endParaRPr lang="en-US"/>
           </a:p>
@@ -379,7 +380,7 @@
           <a:p>
             <a:fld id="{A82030ED-90A4-344D-B09D-B3A0E4D04B08}" type="datetimeFigureOut">
               <a:rPr lang="en-US" smtClean="0"/>
-              <a:t>4/18/12</a:t>
+              <a:t>4/19/12</a:t>
             </a:fld>
             <a:endParaRPr lang="en-US"/>
           </a:p>
@@ -829,7 +830,7 @@
           <a:p>
             <a:fld id="{BCFA6348-E2B7-E44C-866F-1D371721F646}" type="datetime1">
               <a:rPr lang="en-US" smtClean="0"/>
-              <a:t>4/18/12</a:t>
+              <a:t>4/19/12</a:t>
             </a:fld>
             <a:endParaRPr lang="en-US"/>
           </a:p>
@@ -999,7 +1000,7 @@
           <a:p>
             <a:fld id="{491DA98A-DE65-464D-84FF-1AAA5406DF0E}" type="datetime1">
               <a:rPr lang="en-US" smtClean="0"/>
-              <a:t>4/18/12</a:t>
+              <a:t>4/19/12</a:t>
             </a:fld>
             <a:endParaRPr lang="en-US"/>
           </a:p>
@@ -1179,7 +1180,7 @@
           <a:p>
             <a:fld id="{28F6CC0F-AC9F-E24C-90CD-0FD2A7EBCC23}" type="datetime1">
               <a:rPr lang="en-US" smtClean="0"/>
-              <a:t>4/18/12</a:t>
+              <a:t>4/19/12</a:t>
             </a:fld>
             <a:endParaRPr lang="en-US"/>
           </a:p>
@@ -1349,7 +1350,7 @@
           <a:p>
             <a:fld id="{C7DA0989-8C21-0E47-9B68-27837BA1210C}" type="datetime1">
               <a:rPr lang="en-US" smtClean="0"/>
-              <a:t>4/18/12</a:t>
+              <a:t>4/19/12</a:t>
             </a:fld>
             <a:endParaRPr lang="en-US"/>
           </a:p>
@@ -1595,7 +1596,7 @@
           <a:p>
             <a:fld id="{67166247-49CE-C949-85DC-1B364CFB1BFB}" type="datetime1">
               <a:rPr lang="en-US" smtClean="0"/>
-              <a:t>4/18/12</a:t>
+              <a:t>4/19/12</a:t>
             </a:fld>
             <a:endParaRPr lang="en-US"/>
           </a:p>
@@ -1883,7 +1884,7 @@
           <a:p>
             <a:fld id="{258C31DD-F3DA-1447-9775-9AFC2EB0F8A2}" type="datetime1">
               <a:rPr lang="en-US" smtClean="0"/>
-              <a:t>4/18/12</a:t>
+              <a:t>4/19/12</a:t>
             </a:fld>
             <a:endParaRPr lang="en-US"/>
           </a:p>
@@ -2305,7 +2306,7 @@
           <a:p>
             <a:fld id="{6C533E67-7A0A-0B4F-BCB7-7960768741BE}" type="datetime1">
               <a:rPr lang="en-US" smtClean="0"/>
-              <a:t>4/18/12</a:t>
+              <a:t>4/19/12</a:t>
             </a:fld>
             <a:endParaRPr lang="en-US"/>
           </a:p>
@@ -2423,7 +2424,7 @@
           <a:p>
             <a:fld id="{0AD86785-18C0-284B-A6C6-708E2D655CF0}" type="datetime1">
               <a:rPr lang="en-US" smtClean="0"/>
-              <a:t>4/18/12</a:t>
+              <a:t>4/19/12</a:t>
             </a:fld>
             <a:endParaRPr lang="en-US"/>
           </a:p>
@@ -2518,7 +2519,7 @@
           <a:p>
             <a:fld id="{3C9098B5-F0E0-8F48-B6B1-D0C8D5DAE986}" type="datetime1">
               <a:rPr lang="en-US" smtClean="0"/>
-              <a:t>4/18/12</a:t>
+              <a:t>4/19/12</a:t>
             </a:fld>
             <a:endParaRPr lang="en-US"/>
           </a:p>
@@ -2795,7 +2796,7 @@
           <a:p>
             <a:fld id="{11F93AA3-127D-744A-B49D-ABF03EE2B88C}" type="datetime1">
               <a:rPr lang="en-US" smtClean="0"/>
-              <a:t>4/18/12</a:t>
+              <a:t>4/19/12</a:t>
             </a:fld>
             <a:endParaRPr lang="en-US"/>
           </a:p>
@@ -3048,7 +3049,7 @@
           <a:p>
             <a:fld id="{691DC0DE-229A-754F-A122-1D232EA07F68}" type="datetime1">
               <a:rPr lang="en-US" smtClean="0"/>
-              <a:t>4/18/12</a:t>
+              <a:t>4/19/12</a:t>
             </a:fld>
             <a:endParaRPr lang="en-US"/>
           </a:p>
@@ -3261,7 +3262,7 @@
           <a:p>
             <a:fld id="{32C8D833-2F40-FE44-8CE2-E825527D6578}" type="datetime1">
               <a:rPr lang="en-US" smtClean="0"/>
-              <a:t>4/18/12</a:t>
+              <a:t>4/19/12</a:t>
             </a:fld>
             <a:endParaRPr lang="en-US"/>
           </a:p>
@@ -3690,15 +3691,7 @@
           <a:p>
             <a:r>
               <a:rPr lang="en-US" dirty="0" smtClean="0"/>
-              <a:t>18</a:t>
-            </a:r>
-            <a:r>
-              <a:rPr lang="en-US" dirty="0" smtClean="0"/>
-              <a:t> </a:t>
-            </a:r>
-            <a:r>
-              <a:rPr lang="en-US" dirty="0" smtClean="0"/>
-              <a:t>Apr 2012</a:t>
+              <a:t>18 Apr 2012</a:t>
             </a:r>
             <a:endParaRPr lang="en-US" dirty="0"/>
           </a:p>
@@ -3737,6 +3730,13 @@
   <p:clrMapOvr>
     <a:masterClrMapping/>
   </p:clrMapOvr>
+  <p:timing>
+    <p:tnLst>
+      <p:par>
+        <p:cTn xmlns:p14="http://schemas.microsoft.com/office/powerpoint/2010/main" id="1" dur="indefinite" restart="never" nodeType="tmRoot"/>
+      </p:par>
+    </p:tnLst>
+  </p:timing>
 </p:sld>
 </file>
 
@@ -3859,6 +3859,13 @@
   <p:clrMapOvr>
     <a:masterClrMapping/>
   </p:clrMapOvr>
+  <p:timing>
+    <p:tnLst>
+      <p:par>
+        <p:cTn xmlns:p14="http://schemas.microsoft.com/office/powerpoint/2010/main" id="1" dur="indefinite" restart="never" nodeType="tmRoot"/>
+      </p:par>
+    </p:tnLst>
+  </p:timing>
 </p:sld>
 </file>
 
@@ -3968,6 +3975,13 @@
   <p:clrMapOvr>
     <a:masterClrMapping/>
   </p:clrMapOvr>
+  <p:timing>
+    <p:tnLst>
+      <p:par>
+        <p:cTn xmlns:p14="http://schemas.microsoft.com/office/powerpoint/2010/main" id="1" dur="indefinite" restart="never" nodeType="tmRoot"/>
+      </p:par>
+    </p:tnLst>
+  </p:timing>
 </p:sld>
 </file>
 
@@ -4062,8 +4076,13 @@
             </a:pPr>
             <a:r>
               <a:rPr lang="en-US" dirty="0" smtClean="0"/>
-              <a:t>Test suite</a:t>
-            </a:r>
+              <a:t>Test </a:t>
+            </a:r>
+            <a:r>
+              <a:rPr lang="en-US" dirty="0" smtClean="0"/>
+              <a:t>suite creation</a:t>
+            </a:r>
+            <a:endParaRPr lang="en-US" dirty="0" smtClean="0"/>
           </a:p>
           <a:p>
             <a:pPr marL="1200150" lvl="2" indent="-342900"/>
@@ -4125,6 +4144,13 @@
   <p:clrMapOvr>
     <a:masterClrMapping/>
   </p:clrMapOvr>
+  <p:timing>
+    <p:tnLst>
+      <p:par>
+        <p:cTn xmlns:p14="http://schemas.microsoft.com/office/powerpoint/2010/main" id="1" dur="indefinite" restart="never" nodeType="tmRoot"/>
+      </p:par>
+    </p:tnLst>
+  </p:timing>
 </p:sld>
 </file>
 
@@ -4326,6 +4352,13 @@
   <p:clrMapOvr>
     <a:masterClrMapping/>
   </p:clrMapOvr>
+  <p:timing>
+    <p:tnLst>
+      <p:par>
+        <p:cTn xmlns:p14="http://schemas.microsoft.com/office/powerpoint/2010/main" id="1" dur="indefinite" restart="never" nodeType="tmRoot"/>
+      </p:par>
+    </p:tnLst>
+  </p:timing>
 </p:sld>
 </file>
 
@@ -4421,6 +4454,13 @@
   <p:clrMapOvr>
     <a:masterClrMapping/>
   </p:clrMapOvr>
+  <p:timing>
+    <p:tnLst>
+      <p:par>
+        <p:cTn xmlns:p14="http://schemas.microsoft.com/office/powerpoint/2010/main" id="1" dur="indefinite" restart="never" nodeType="tmRoot"/>
+      </p:par>
+    </p:tnLst>
+  </p:timing>
 </p:sld>
 </file>
 
@@ -4479,23 +4519,28 @@
           <a:bodyPr/>
           <a:lstStyle/>
           <a:p>
-            <a:r>
-              <a:rPr lang="en-US" dirty="0" smtClean="0"/>
-              <a:t>Code walk-through</a:t>
-            </a:r>
-          </a:p>
-          <a:p>
-            <a:r>
-              <a:rPr lang="en-US" dirty="0" smtClean="0"/>
-              <a:t>Traversal example</a:t>
-            </a:r>
-          </a:p>
-          <a:p>
-            <a:r>
-              <a:rPr lang="en-US" dirty="0" smtClean="0"/>
-              <a:t>URL reduction</a:t>
-            </a:r>
-            <a:endParaRPr lang="en-US" dirty="0"/>
+            <a:pPr marL="0" indent="0" algn="ctr">
+              <a:buNone/>
+            </a:pPr>
+            <a:endParaRPr lang="en-US" dirty="0" smtClean="0"/>
+          </a:p>
+          <a:p>
+            <a:pPr marL="0" indent="0" algn="ctr">
+              <a:buNone/>
+            </a:pPr>
+            <a:r>
+              <a:rPr lang="en-US" dirty="0" smtClean="0"/>
+              <a:t>Code </a:t>
+            </a:r>
+            <a:r>
+              <a:rPr lang="en-US" dirty="0" smtClean="0"/>
+              <a:t>walk-</a:t>
+            </a:r>
+            <a:r>
+              <a:rPr lang="en-US" dirty="0" smtClean="0"/>
+              <a:t>through</a:t>
+            </a:r>
+            <a:endParaRPr lang="en-US" dirty="0" smtClean="0"/>
           </a:p>
         </p:txBody>
       </p:sp>
@@ -4532,6 +4577,13 @@
   <p:clrMapOvr>
     <a:masterClrMapping/>
   </p:clrMapOvr>
+  <p:timing>
+    <p:tnLst>
+      <p:par>
+        <p:cTn xmlns:p14="http://schemas.microsoft.com/office/powerpoint/2010/main" id="1" dur="indefinite" restart="never" nodeType="tmRoot"/>
+      </p:par>
+    </p:tnLst>
+  </p:timing>
 </p:sld>
 </file>
 
@@ -4716,6 +4768,13 @@
   <p:clrMapOvr>
     <a:masterClrMapping/>
   </p:clrMapOvr>
+  <p:timing>
+    <p:tnLst>
+      <p:par>
+        <p:cTn xmlns:p14="http://schemas.microsoft.com/office/powerpoint/2010/main" id="1" dur="indefinite" restart="never" nodeType="tmRoot"/>
+      </p:par>
+    </p:tnLst>
+  </p:timing>
 </p:sld>
 </file>
 
@@ -4803,7 +4862,15 @@
             <a:pPr lvl="1"/>
             <a:r>
               <a:rPr lang="en-US" dirty="0" smtClean="0"/>
-              <a:t>Intercept responses via proxy and inject </a:t>
+              <a:t>Intercept responses </a:t>
+            </a:r>
+            <a:r>
+              <a:rPr lang="en-US" dirty="0" smtClean="0"/>
+              <a:t>and </a:t>
+            </a:r>
+            <a:r>
+              <a:rPr lang="en-US" dirty="0" smtClean="0"/>
+              <a:t>inject </a:t>
             </a:r>
             <a:r>
               <a:rPr lang="en-US" dirty="0" err="1" smtClean="0"/>
@@ -4865,6 +4932,13 @@
   <p:clrMapOvr>
     <a:masterClrMapping/>
   </p:clrMapOvr>
+  <p:timing>
+    <p:tnLst>
+      <p:par>
+        <p:cTn xmlns:p14="http://schemas.microsoft.com/office/powerpoint/2010/main" id="1" dur="indefinite" restart="never" nodeType="tmRoot"/>
+      </p:par>
+    </p:tnLst>
+  </p:timing>
 </p:sld>
 </file>
 
@@ -5013,6 +5087,13 @@
   <p:clrMapOvr>
     <a:masterClrMapping/>
   </p:clrMapOvr>
+  <p:timing>
+    <p:tnLst>
+      <p:par>
+        <p:cTn xmlns:p14="http://schemas.microsoft.com/office/powerpoint/2010/main" id="1" dur="indefinite" restart="never" nodeType="tmRoot"/>
+      </p:par>
+    </p:tnLst>
+  </p:timing>
 </p:sld>
 </file>
 
@@ -5140,6 +5221,13 @@
   <p:clrMapOvr>
     <a:masterClrMapping/>
   </p:clrMapOvr>
+  <p:timing>
+    <p:tnLst>
+      <p:par>
+        <p:cTn xmlns:p14="http://schemas.microsoft.com/office/powerpoint/2010/main" id="1" dur="indefinite" restart="never" nodeType="tmRoot"/>
+      </p:par>
+    </p:tnLst>
+  </p:timing>
 </p:sld>
 </file>
 
@@ -5261,6 +5349,174 @@
   <p:clrMapOvr>
     <a:masterClrMapping/>
   </p:clrMapOvr>
+  <p:timing>
+    <p:tnLst>
+      <p:par>
+        <p:cTn xmlns:p14="http://schemas.microsoft.com/office/powerpoint/2010/main" id="1" dur="indefinite" restart="never" nodeType="tmRoot"/>
+      </p:par>
+    </p:tnLst>
+  </p:timing>
+</p:sld>
+</file>
+
+<file path=ppt/slides/slide20.xml><?xml version="1.0" encoding="utf-8"?>
+<p:sld xmlns:a="http://schemas.openxmlformats.org/drawingml/2006/main" xmlns:r="http://schemas.openxmlformats.org/officeDocument/2006/relationships" xmlns:p="http://schemas.openxmlformats.org/presentationml/2006/main">
+  <p:cSld>
+    <p:spTree>
+      <p:nvGrpSpPr>
+        <p:cNvPr id="1" name=""/>
+        <p:cNvGrpSpPr/>
+        <p:nvPr/>
+      </p:nvGrpSpPr>
+      <p:grpSpPr>
+        <a:xfrm>
+          <a:off x="0" y="0"/>
+          <a:ext cx="0" cy="0"/>
+          <a:chOff x="0" y="0"/>
+          <a:chExt cx="0" cy="0"/>
+        </a:xfrm>
+      </p:grpSpPr>
+      <p:sp>
+        <p:nvSpPr>
+          <p:cNvPr id="2" name="Title 1"/>
+          <p:cNvSpPr>
+            <a:spLocks noGrp="1"/>
+          </p:cNvSpPr>
+          <p:nvPr>
+            <p:ph type="title"/>
+          </p:nvPr>
+        </p:nvSpPr>
+        <p:spPr/>
+        <p:txBody>
+          <a:bodyPr/>
+          <a:lstStyle/>
+          <a:p>
+            <a:r>
+              <a:rPr lang="en-US" dirty="0" smtClean="0"/>
+              <a:t>What’s left?</a:t>
+            </a:r>
+            <a:endParaRPr lang="en-US" dirty="0"/>
+          </a:p>
+        </p:txBody>
+      </p:sp>
+      <p:sp>
+        <p:nvSpPr>
+          <p:cNvPr id="3" name="Content Placeholder 2"/>
+          <p:cNvSpPr>
+            <a:spLocks noGrp="1"/>
+          </p:cNvSpPr>
+          <p:nvPr>
+            <p:ph idx="1"/>
+          </p:nvPr>
+        </p:nvSpPr>
+        <p:spPr/>
+        <p:txBody>
+          <a:bodyPr/>
+          <a:lstStyle/>
+          <a:p>
+            <a:r>
+              <a:rPr lang="en-US" dirty="0" smtClean="0"/>
+              <a:t>Improve output of </a:t>
+            </a:r>
+            <a:r>
+              <a:rPr lang="en-US" dirty="0" smtClean="0"/>
+              <a:t>Test creation and results</a:t>
+            </a:r>
+            <a:endParaRPr lang="en-US" dirty="0" smtClean="0"/>
+          </a:p>
+          <a:p>
+            <a:r>
+              <a:rPr lang="en-US" dirty="0" smtClean="0"/>
+              <a:t>Add additional </a:t>
+            </a:r>
+            <a:r>
+              <a:rPr lang="en-US" dirty="0" smtClean="0"/>
+              <a:t>prioritizations</a:t>
+            </a:r>
+          </a:p>
+          <a:p>
+            <a:pPr lvl="1"/>
+            <a:r>
+              <a:rPr lang="en-US" dirty="0" smtClean="0"/>
+              <a:t>Allow for custom prioritizations to be passed in</a:t>
+            </a:r>
+            <a:endParaRPr lang="en-US" dirty="0" smtClean="0"/>
+          </a:p>
+          <a:p>
+            <a:pPr lvl="2"/>
+            <a:r>
+              <a:rPr lang="en-US" dirty="0" smtClean="0"/>
+              <a:t>Ex: most </a:t>
+            </a:r>
+            <a:r>
+              <a:rPr lang="en-US" dirty="0" smtClean="0"/>
+              <a:t>integral nodes and their targeted relations are tested first</a:t>
+            </a:r>
+          </a:p>
+          <a:p>
+            <a:r>
+              <a:rPr lang="en-US" dirty="0" smtClean="0"/>
+              <a:t>Add additional </a:t>
+            </a:r>
+            <a:r>
+              <a:rPr lang="en-US" dirty="0" smtClean="0"/>
+              <a:t>reductions</a:t>
+            </a:r>
+          </a:p>
+          <a:p>
+            <a:pPr lvl="1"/>
+            <a:r>
+              <a:rPr lang="en-US" dirty="0" smtClean="0"/>
+              <a:t>Allow for custom reductions</a:t>
+            </a:r>
+            <a:endParaRPr lang="en-US" dirty="0" smtClean="0"/>
+          </a:p>
+          <a:p>
+            <a:pPr lvl="1"/>
+            <a:endParaRPr lang="en-US" dirty="0"/>
+          </a:p>
+        </p:txBody>
+      </p:sp>
+      <p:sp>
+        <p:nvSpPr>
+          <p:cNvPr id="4" name="Slide Number Placeholder 3"/>
+          <p:cNvSpPr>
+            <a:spLocks noGrp="1"/>
+          </p:cNvSpPr>
+          <p:nvPr>
+            <p:ph type="sldNum" sz="quarter" idx="12"/>
+          </p:nvPr>
+        </p:nvSpPr>
+        <p:spPr/>
+        <p:txBody>
+          <a:bodyPr/>
+          <a:lstStyle/>
+          <a:p>
+            <a:fld id="{81E3E259-2546-3440-BC7C-5127A9872B60}" type="slidenum">
+              <a:rPr lang="en-US" smtClean="0"/>
+              <a:t>20</a:t>
+            </a:fld>
+            <a:endParaRPr lang="en-US"/>
+          </a:p>
+        </p:txBody>
+      </p:sp>
+    </p:spTree>
+    <p:extLst>
+      <p:ext uri="{BB962C8B-B14F-4D97-AF65-F5344CB8AC3E}">
+        <p14:creationId xmlns:p14="http://schemas.microsoft.com/office/powerpoint/2010/main" val="1321851571"/>
+      </p:ext>
+    </p:extLst>
+  </p:cSld>
+  <p:clrMapOvr>
+    <a:masterClrMapping/>
+  </p:clrMapOvr>
+  <p:timing>
+    <p:tnLst>
+      <p:par>
+        <p:cTn xmlns:p14="http://schemas.microsoft.com/office/powerpoint/2010/main" id="1" dur="indefinite" restart="never" nodeType="tmRoot"/>
+      </p:par>
+    </p:tnLst>
+  </p:timing>
 </p:sld>
 </file>
 
@@ -5324,11 +5580,7 @@
             </a:pPr>
             <a:r>
               <a:rPr lang="en-US" dirty="0" smtClean="0"/>
-              <a:t>Rich Web Applications consume and create data asynchronously (after initial page load) and frequently manipulating the DOM (HTML Document Object Model) to display that data</a:t>
-            </a:r>
-            <a:r>
-              <a:rPr lang="en-US" dirty="0" smtClean="0"/>
-              <a:t>.</a:t>
+              <a:t>Rich Web Applications consume and create data asynchronously (after initial page load) and frequently manipulating the DOM (HTML Document Object Model) to display that data.</a:t>
             </a:r>
           </a:p>
           <a:p>
@@ -5343,11 +5595,7 @@
             </a:pPr>
             <a:r>
               <a:rPr lang="en-US" dirty="0" smtClean="0"/>
-              <a:t>Errors </a:t>
-            </a:r>
-            <a:r>
-              <a:rPr lang="en-US" dirty="0" smtClean="0"/>
-              <a:t>often occur on the client-side in the form of </a:t>
+              <a:t>Problems often occur on the client-side in the form of </a:t>
             </a:r>
             <a:r>
               <a:rPr lang="en-US" dirty="0" err="1" smtClean="0"/>
@@ -5363,7 +5611,7 @@
             </a:r>
             <a:r>
               <a:rPr lang="en-US" dirty="0" smtClean="0"/>
-              <a:t>xceptions and transport (network) errors.</a:t>
+              <a:t>xceptions and transport (network) related errors.</a:t>
             </a:r>
             <a:endParaRPr lang="en-US" dirty="0"/>
           </a:p>
@@ -5402,6 +5650,13 @@
   <p:clrMapOvr>
     <a:masterClrMapping/>
   </p:clrMapOvr>
+  <p:timing>
+    <p:tnLst>
+      <p:par>
+        <p:cTn xmlns:p14="http://schemas.microsoft.com/office/powerpoint/2010/main" id="1" dur="indefinite" restart="never" nodeType="tmRoot"/>
+      </p:par>
+    </p:tnLst>
+  </p:timing>
 </p:sld>
 </file>
 
@@ -5558,6 +5813,13 @@
   <p:clrMapOvr>
     <a:masterClrMapping/>
   </p:clrMapOvr>
+  <p:timing>
+    <p:tnLst>
+      <p:par>
+        <p:cTn xmlns:p14="http://schemas.microsoft.com/office/powerpoint/2010/main" id="1" dur="indefinite" restart="never" nodeType="tmRoot"/>
+      </p:par>
+    </p:tnLst>
+  </p:timing>
 </p:sld>
 </file>
 
@@ -5642,7 +5904,15 @@
           <a:p>
             <a:r>
               <a:rPr lang="en-US" dirty="0" smtClean="0"/>
-              <a:t>Use graph to store potential test suites</a:t>
+              <a:t>Use graph to </a:t>
+            </a:r>
+            <a:r>
+              <a:rPr lang="en-US" dirty="0" smtClean="0"/>
+              <a:t>extract potential </a:t>
+            </a:r>
+            <a:r>
+              <a:rPr lang="en-US" dirty="0" smtClean="0"/>
+              <a:t>test suites</a:t>
             </a:r>
             <a:endParaRPr lang="en-US" dirty="0"/>
           </a:p>
@@ -5681,6 +5951,13 @@
   <p:clrMapOvr>
     <a:masterClrMapping/>
   </p:clrMapOvr>
+  <p:timing>
+    <p:tnLst>
+      <p:par>
+        <p:cTn xmlns:p14="http://schemas.microsoft.com/office/powerpoint/2010/main" id="1" dur="indefinite" restart="never" nodeType="tmRoot"/>
+      </p:par>
+    </p:tnLst>
+  </p:timing>
 </p:sld>
 </file>
 
@@ -5769,7 +6046,6 @@
               <a:rPr lang="en-US" dirty="0" smtClean="0"/>
               <a:t>Example</a:t>
             </a:r>
-            <a:endParaRPr lang="en-US" dirty="0" smtClean="0"/>
           </a:p>
           <a:p>
             <a:pPr lvl="2"/>
@@ -5807,7 +6083,18 @@
             <a:pPr lvl="1"/>
             <a:r>
               <a:rPr lang="en-US" dirty="0" smtClean="0"/>
-              <a:t>Problem: Doesn’t work with HTML5 </a:t>
+              <a:t>Future Problem</a:t>
+            </a:r>
+          </a:p>
+          <a:p>
+            <a:pPr lvl="2"/>
+            <a:r>
+              <a:rPr lang="en-US" dirty="0" smtClean="0"/>
+              <a:t>Doesn’t </a:t>
+            </a:r>
+            <a:r>
+              <a:rPr lang="en-US" dirty="0" smtClean="0"/>
+              <a:t>work with HTML5 </a:t>
             </a:r>
             <a:r>
               <a:rPr lang="en-US" dirty="0" err="1" smtClean="0"/>
@@ -5850,6 +6137,13 @@
   <p:clrMapOvr>
     <a:masterClrMapping/>
   </p:clrMapOvr>
+  <p:timing>
+    <p:tnLst>
+      <p:par>
+        <p:cTn xmlns:p14="http://schemas.microsoft.com/office/powerpoint/2010/main" id="1" dur="indefinite" restart="never" nodeType="tmRoot"/>
+      </p:par>
+    </p:tnLst>
+  </p:timing>
 </p:sld>
 </file>
 
@@ -6016,6 +6310,13 @@
   <p:clrMapOvr>
     <a:masterClrMapping/>
   </p:clrMapOvr>
+  <p:timing>
+    <p:tnLst>
+      <p:par>
+        <p:cTn xmlns:p14="http://schemas.microsoft.com/office/powerpoint/2010/main" id="1" dur="indefinite" restart="never" nodeType="tmRoot"/>
+      </p:par>
+    </p:tnLst>
+  </p:timing>
 </p:sld>
 </file>
 
@@ -6093,15 +6394,39 @@
             <a:pPr lvl="1"/>
             <a:r>
               <a:rPr lang="en-US" dirty="0" smtClean="0"/>
+              <a:t>Examples</a:t>
+            </a:r>
+            <a:endParaRPr lang="en-US" dirty="0" smtClean="0"/>
+          </a:p>
+          <a:p>
+            <a:pPr lvl="2"/>
+            <a:r>
+              <a:rPr lang="en-US" dirty="0" smtClean="0"/>
               <a:t>Pixel location of link (0,0 top left)</a:t>
             </a:r>
           </a:p>
           <a:p>
-            <a:pPr lvl="1"/>
-            <a:r>
-              <a:rPr lang="en-US" dirty="0" smtClean="0"/>
-              <a:t>Key parts of URL as attributes</a:t>
-            </a:r>
+            <a:pPr lvl="2"/>
+            <a:r>
+              <a:rPr lang="en-US" dirty="0" smtClean="0"/>
+              <a:t>Key parts of URL as </a:t>
+            </a:r>
+            <a:r>
+              <a:rPr lang="en-US" dirty="0" smtClean="0"/>
+              <a:t>attributes</a:t>
+            </a:r>
+          </a:p>
+          <a:p>
+            <a:pPr lvl="2"/>
+            <a:r>
+              <a:rPr lang="en-US" dirty="0" smtClean="0"/>
+              <a:t>Anchor Text</a:t>
+            </a:r>
+          </a:p>
+          <a:p>
+            <a:pPr marL="457200" lvl="1" indent="0">
+              <a:buNone/>
+            </a:pPr>
             <a:endParaRPr lang="en-US" dirty="0" smtClean="0"/>
           </a:p>
           <a:p>
@@ -6143,6 +6468,13 @@
   <p:clrMapOvr>
     <a:masterClrMapping/>
   </p:clrMapOvr>
+  <p:timing>
+    <p:tnLst>
+      <p:par>
+        <p:cTn xmlns:p14="http://schemas.microsoft.com/office/powerpoint/2010/main" id="1" dur="indefinite" restart="never" nodeType="tmRoot"/>
+      </p:par>
+    </p:tnLst>
+  </p:timing>
 </p:sld>
 </file>
 
@@ -6239,14 +6571,12 @@
               <a:rPr lang="en-US" dirty="0" smtClean="0"/>
               <a:t>Simple API</a:t>
             </a:r>
-            <a:endParaRPr lang="en-US" dirty="0" smtClean="0"/>
           </a:p>
           <a:p>
             <a:r>
               <a:rPr lang="en-US" dirty="0" smtClean="0"/>
               <a:t>Awesome</a:t>
             </a:r>
-            <a:endParaRPr lang="en-US" dirty="0" smtClean="0"/>
           </a:p>
           <a:p>
             <a:pPr marL="0" indent="0">
@@ -6289,6 +6619,13 @@
   <p:clrMapOvr>
     <a:masterClrMapping/>
   </p:clrMapOvr>
+  <p:timing>
+    <p:tnLst>
+      <p:par>
+        <p:cTn xmlns:p14="http://schemas.microsoft.com/office/powerpoint/2010/main" id="1" dur="indefinite" restart="never" nodeType="tmRoot"/>
+      </p:par>
+    </p:tnLst>
+  </p:timing>
 </p:sld>
 </file>
 

</xml_diff>